<commit_message>
aktualizace prezentace s postupem
</commit_message>
<xml_diff>
--- a/03-model/notes-leanmapper-reseni.pptx
+++ b/03-model/notes-leanmapper-reseni.pptx
@@ -13,6 +13,13 @@
     <p:sldId id="261" r:id="rId7"/>
     <p:sldId id="260" r:id="rId8"/>
     <p:sldId id="263" r:id="rId9"/>
+    <p:sldId id="270" r:id="rId10"/>
+    <p:sldId id="264" r:id="rId11"/>
+    <p:sldId id="265" r:id="rId12"/>
+    <p:sldId id="266" r:id="rId13"/>
+    <p:sldId id="267" r:id="rId14"/>
+    <p:sldId id="268" r:id="rId15"/>
+    <p:sldId id="269" r:id="rId16"/>
   </p:sldIdLst>
   <p:sldSz cx="12192000" cy="6858000"/>
   <p:notesSz cx="6858000" cy="9144000"/>
@@ -111,6 +118,11 @@
       </a:defRPr>
     </a:lvl9pPr>
   </p:defaultTextStyle>
+  <p:extLst>
+    <p:ext uri="{EFAFB233-063F-42B5-8137-9DF3F51BA10A}">
+      <p15:sldGuideLst xmlns:p15="http://schemas.microsoft.com/office/powerpoint/2012/main"/>
+    </p:ext>
+  </p:extLst>
 </p:presentation>
 </file>
 
@@ -261,7 +273,7 @@
           <a:p>
             <a:fld id="{2620888B-3C45-4A6A-ABB0-8EB4731580F0}" type="datetimeFigureOut">
               <a:rPr lang="cs-CZ" smtClean="0"/>
-              <a:t>09.10.2021</a:t>
+              <a:t>06.10.2024</a:t>
             </a:fld>
             <a:endParaRPr lang="cs-CZ"/>
           </a:p>
@@ -459,7 +471,7 @@
           <a:p>
             <a:fld id="{2620888B-3C45-4A6A-ABB0-8EB4731580F0}" type="datetimeFigureOut">
               <a:rPr lang="cs-CZ" smtClean="0"/>
-              <a:t>09.10.2021</a:t>
+              <a:t>06.10.2024</a:t>
             </a:fld>
             <a:endParaRPr lang="cs-CZ"/>
           </a:p>
@@ -667,7 +679,7 @@
           <a:p>
             <a:fld id="{2620888B-3C45-4A6A-ABB0-8EB4731580F0}" type="datetimeFigureOut">
               <a:rPr lang="cs-CZ" smtClean="0"/>
-              <a:t>09.10.2021</a:t>
+              <a:t>06.10.2024</a:t>
             </a:fld>
             <a:endParaRPr lang="cs-CZ"/>
           </a:p>
@@ -865,7 +877,7 @@
           <a:p>
             <a:fld id="{2620888B-3C45-4A6A-ABB0-8EB4731580F0}" type="datetimeFigureOut">
               <a:rPr lang="cs-CZ" smtClean="0"/>
-              <a:t>09.10.2021</a:t>
+              <a:t>06.10.2024</a:t>
             </a:fld>
             <a:endParaRPr lang="cs-CZ"/>
           </a:p>
@@ -1140,7 +1152,7 @@
           <a:p>
             <a:fld id="{2620888B-3C45-4A6A-ABB0-8EB4731580F0}" type="datetimeFigureOut">
               <a:rPr lang="cs-CZ" smtClean="0"/>
-              <a:t>09.10.2021</a:t>
+              <a:t>06.10.2024</a:t>
             </a:fld>
             <a:endParaRPr lang="cs-CZ"/>
           </a:p>
@@ -1405,7 +1417,7 @@
           <a:p>
             <a:fld id="{2620888B-3C45-4A6A-ABB0-8EB4731580F0}" type="datetimeFigureOut">
               <a:rPr lang="cs-CZ" smtClean="0"/>
-              <a:t>09.10.2021</a:t>
+              <a:t>06.10.2024</a:t>
             </a:fld>
             <a:endParaRPr lang="cs-CZ"/>
           </a:p>
@@ -1817,7 +1829,7 @@
           <a:p>
             <a:fld id="{2620888B-3C45-4A6A-ABB0-8EB4731580F0}" type="datetimeFigureOut">
               <a:rPr lang="cs-CZ" smtClean="0"/>
-              <a:t>09.10.2021</a:t>
+              <a:t>06.10.2024</a:t>
             </a:fld>
             <a:endParaRPr lang="cs-CZ"/>
           </a:p>
@@ -1958,7 +1970,7 @@
           <a:p>
             <a:fld id="{2620888B-3C45-4A6A-ABB0-8EB4731580F0}" type="datetimeFigureOut">
               <a:rPr lang="cs-CZ" smtClean="0"/>
-              <a:t>09.10.2021</a:t>
+              <a:t>06.10.2024</a:t>
             </a:fld>
             <a:endParaRPr lang="cs-CZ"/>
           </a:p>
@@ -2071,7 +2083,7 @@
           <a:p>
             <a:fld id="{2620888B-3C45-4A6A-ABB0-8EB4731580F0}" type="datetimeFigureOut">
               <a:rPr lang="cs-CZ" smtClean="0"/>
-              <a:t>09.10.2021</a:t>
+              <a:t>06.10.2024</a:t>
             </a:fld>
             <a:endParaRPr lang="cs-CZ"/>
           </a:p>
@@ -2382,7 +2394,7 @@
           <a:p>
             <a:fld id="{2620888B-3C45-4A6A-ABB0-8EB4731580F0}" type="datetimeFigureOut">
               <a:rPr lang="cs-CZ" smtClean="0"/>
-              <a:t>09.10.2021</a:t>
+              <a:t>06.10.2024</a:t>
             </a:fld>
             <a:endParaRPr lang="cs-CZ"/>
           </a:p>
@@ -2670,7 +2682,7 @@
           <a:p>
             <a:fld id="{2620888B-3C45-4A6A-ABB0-8EB4731580F0}" type="datetimeFigureOut">
               <a:rPr lang="cs-CZ" smtClean="0"/>
-              <a:t>09.10.2021</a:t>
+              <a:t>06.10.2024</a:t>
             </a:fld>
             <a:endParaRPr lang="cs-CZ"/>
           </a:p>
@@ -2911,7 +2923,7 @@
           <a:p>
             <a:fld id="{2620888B-3C45-4A6A-ABB0-8EB4731580F0}" type="datetimeFigureOut">
               <a:rPr lang="cs-CZ" smtClean="0"/>
-              <a:t>09.10.2021</a:t>
+              <a:t>06.10.2024</a:t>
             </a:fld>
             <a:endParaRPr lang="cs-CZ"/>
           </a:p>
@@ -3402,6 +3414,1443 @@
 </p:sld>
 </file>
 
+<file path=ppt/slides/slide10.xml><?xml version="1.0" encoding="utf-8"?>
+<p:sld xmlns:a="http://schemas.openxmlformats.org/drawingml/2006/main" xmlns:r="http://schemas.openxmlformats.org/officeDocument/2006/relationships" xmlns:p="http://schemas.openxmlformats.org/presentationml/2006/main">
+  <p:cSld>
+    <p:spTree>
+      <p:nvGrpSpPr>
+        <p:cNvPr id="1" name=""/>
+        <p:cNvGrpSpPr/>
+        <p:nvPr/>
+      </p:nvGrpSpPr>
+      <p:grpSpPr>
+        <a:xfrm>
+          <a:off x="0" y="0"/>
+          <a:ext cx="0" cy="0"/>
+          <a:chOff x="0" y="0"/>
+          <a:chExt cx="0" cy="0"/>
+        </a:xfrm>
+      </p:grpSpPr>
+      <p:sp>
+        <p:nvSpPr>
+          <p:cNvPr id="2" name="Nadpis 1">
+            <a:extLst>
+              <a:ext uri="{FF2B5EF4-FFF2-40B4-BE49-F238E27FC236}">
+                <a16:creationId xmlns:a16="http://schemas.microsoft.com/office/drawing/2014/main" id="{61541B29-1738-A9C1-76C5-01B67AA69084}"/>
+              </a:ext>
+            </a:extLst>
+          </p:cNvPr>
+          <p:cNvSpPr>
+            <a:spLocks noGrp="1"/>
+          </p:cNvSpPr>
+          <p:nvPr>
+            <p:ph type="title"/>
+          </p:nvPr>
+        </p:nvSpPr>
+        <p:spPr/>
+        <p:txBody>
+          <a:bodyPr/>
+          <a:lstStyle/>
+          <a:p>
+            <a:endParaRPr lang="cs-CZ"/>
+          </a:p>
+        </p:txBody>
+      </p:sp>
+      <p:sp>
+        <p:nvSpPr>
+          <p:cNvPr id="3" name="Zástupný obsah 2">
+            <a:extLst>
+              <a:ext uri="{FF2B5EF4-FFF2-40B4-BE49-F238E27FC236}">
+                <a16:creationId xmlns:a16="http://schemas.microsoft.com/office/drawing/2014/main" id="{7F534DA6-C9DB-4A78-6E87-F4082A5F4F80}"/>
+              </a:ext>
+            </a:extLst>
+          </p:cNvPr>
+          <p:cNvSpPr>
+            <a:spLocks noGrp="1"/>
+          </p:cNvSpPr>
+          <p:nvPr>
+            <p:ph idx="1"/>
+          </p:nvPr>
+        </p:nvSpPr>
+        <p:spPr/>
+        <p:txBody>
+          <a:bodyPr/>
+          <a:lstStyle/>
+          <a:p>
+            <a:endParaRPr lang="cs-CZ"/>
+          </a:p>
+        </p:txBody>
+      </p:sp>
+      <p:pic>
+        <p:nvPicPr>
+          <p:cNvPr id="5" name="Obrázek 4">
+            <a:extLst>
+              <a:ext uri="{FF2B5EF4-FFF2-40B4-BE49-F238E27FC236}">
+                <a16:creationId xmlns:a16="http://schemas.microsoft.com/office/drawing/2014/main" id="{4620E567-35B2-977E-3907-9ADF726C31E2}"/>
+              </a:ext>
+            </a:extLst>
+          </p:cNvPr>
+          <p:cNvPicPr>
+            <a:picLocks noChangeAspect="1"/>
+          </p:cNvPicPr>
+          <p:nvPr/>
+        </p:nvPicPr>
+        <p:blipFill>
+          <a:blip r:embed="rId2"/>
+          <a:stretch>
+            <a:fillRect/>
+          </a:stretch>
+        </p:blipFill>
+        <p:spPr>
+          <a:xfrm>
+            <a:off x="0" y="180180"/>
+            <a:ext cx="12192000" cy="6497640"/>
+          </a:xfrm>
+          <a:prstGeom prst="rect">
+            <a:avLst/>
+          </a:prstGeom>
+        </p:spPr>
+      </p:pic>
+      <p:sp>
+        <p:nvSpPr>
+          <p:cNvPr id="4" name="Obdélník 3">
+            <a:extLst>
+              <a:ext uri="{FF2B5EF4-FFF2-40B4-BE49-F238E27FC236}">
+                <a16:creationId xmlns:a16="http://schemas.microsoft.com/office/drawing/2014/main" id="{5EF236EB-2604-CD53-E59C-A4EB337E52A7}"/>
+              </a:ext>
+            </a:extLst>
+          </p:cNvPr>
+          <p:cNvSpPr/>
+          <p:nvPr/>
+        </p:nvSpPr>
+        <p:spPr>
+          <a:xfrm>
+            <a:off x="928915" y="1961695"/>
+            <a:ext cx="1291772" cy="273506"/>
+          </a:xfrm>
+          <a:prstGeom prst="rect">
+            <a:avLst/>
+          </a:prstGeom>
+          <a:noFill/>
+          <a:ln w="38100"/>
+        </p:spPr>
+        <p:style>
+          <a:lnRef idx="2">
+            <a:schemeClr val="accent2"/>
+          </a:lnRef>
+          <a:fillRef idx="1">
+            <a:schemeClr val="lt1"/>
+          </a:fillRef>
+          <a:effectRef idx="0">
+            <a:schemeClr val="accent2"/>
+          </a:effectRef>
+          <a:fontRef idx="minor">
+            <a:schemeClr val="dk1"/>
+          </a:fontRef>
+        </p:style>
+        <p:txBody>
+          <a:bodyPr rtlCol="0" anchor="ctr"/>
+          <a:lstStyle/>
+          <a:p>
+            <a:pPr algn="ctr"/>
+            <a:endParaRPr lang="cs-CZ"/>
+          </a:p>
+        </p:txBody>
+      </p:sp>
+      <p:sp>
+        <p:nvSpPr>
+          <p:cNvPr id="6" name="TextovéPole 5">
+            <a:extLst>
+              <a:ext uri="{FF2B5EF4-FFF2-40B4-BE49-F238E27FC236}">
+                <a16:creationId xmlns:a16="http://schemas.microsoft.com/office/drawing/2014/main" id="{165C94C7-3CF8-0C2C-251A-D89F28015162}"/>
+              </a:ext>
+            </a:extLst>
+          </p:cNvPr>
+          <p:cNvSpPr txBox="1"/>
+          <p:nvPr/>
+        </p:nvSpPr>
+        <p:spPr>
+          <a:xfrm>
+            <a:off x="7822614" y="891153"/>
+            <a:ext cx="4268371" cy="2862322"/>
+          </a:xfrm>
+          <a:prstGeom prst="rect">
+            <a:avLst/>
+          </a:prstGeom>
+        </p:spPr>
+        <p:style>
+          <a:lnRef idx="2">
+            <a:schemeClr val="accent2">
+              <a:shade val="50000"/>
+            </a:schemeClr>
+          </a:lnRef>
+          <a:fillRef idx="1">
+            <a:schemeClr val="accent2"/>
+          </a:fillRef>
+          <a:effectRef idx="0">
+            <a:schemeClr val="accent2"/>
+          </a:effectRef>
+          <a:fontRef idx="minor">
+            <a:schemeClr val="lt1"/>
+          </a:fontRef>
+        </p:style>
+        <p:txBody>
+          <a:bodyPr wrap="square" rtlCol="0">
+            <a:spAutoFit/>
+          </a:bodyPr>
+          <a:lstStyle/>
+          <a:p>
+            <a:r>
+              <a:rPr lang="cs-CZ" dirty="0"/>
+              <a:t>Pro práci s poznámkami budeme potřebovat vytvořit fasádu, která nám zpřístupní příslušnou funkcionalitu. </a:t>
+            </a:r>
+          </a:p>
+          <a:p>
+            <a:endParaRPr lang="cs-CZ" dirty="0"/>
+          </a:p>
+          <a:p>
+            <a:r>
+              <a:rPr lang="cs-CZ" dirty="0"/>
+              <a:t>Vytvoříme novou třídu </a:t>
+            </a:r>
+            <a:r>
+              <a:rPr lang="cs-CZ" dirty="0" err="1"/>
+              <a:t>NotesFacade</a:t>
+            </a:r>
+            <a:r>
+              <a:rPr lang="cs-CZ" dirty="0"/>
+              <a:t>, která si jako závislost vyžádá </a:t>
+            </a:r>
+            <a:r>
+              <a:rPr lang="cs-CZ" dirty="0" err="1"/>
+              <a:t>repozitář</a:t>
+            </a:r>
+            <a:r>
+              <a:rPr lang="cs-CZ" dirty="0"/>
+              <a:t>, který umí poznámky načítat a ukládat (tj. </a:t>
+            </a:r>
+            <a:r>
+              <a:rPr lang="cs-CZ" dirty="0" err="1"/>
+              <a:t>NoteRepository</a:t>
+            </a:r>
+            <a:r>
+              <a:rPr lang="cs-CZ" dirty="0"/>
+              <a:t>). </a:t>
+            </a:r>
+            <a:r>
+              <a:rPr lang="cs-CZ" dirty="0" err="1"/>
+              <a:t>Repozitář</a:t>
+            </a:r>
+            <a:r>
+              <a:rPr lang="cs-CZ" dirty="0"/>
+              <a:t> zadáme jako parametr v konstruktoru, o jeho předání už se postará </a:t>
+            </a:r>
+            <a:r>
+              <a:rPr lang="cs-CZ" dirty="0" err="1"/>
+              <a:t>Nette</a:t>
+            </a:r>
+            <a:r>
+              <a:rPr lang="cs-CZ" dirty="0"/>
+              <a:t>.</a:t>
+            </a:r>
+          </a:p>
+        </p:txBody>
+      </p:sp>
+      <p:sp>
+        <p:nvSpPr>
+          <p:cNvPr id="7" name="Obdélník 6">
+            <a:extLst>
+              <a:ext uri="{FF2B5EF4-FFF2-40B4-BE49-F238E27FC236}">
+                <a16:creationId xmlns:a16="http://schemas.microsoft.com/office/drawing/2014/main" id="{6019B575-738B-2895-6BCF-A389F996C431}"/>
+              </a:ext>
+            </a:extLst>
+          </p:cNvPr>
+          <p:cNvSpPr/>
+          <p:nvPr/>
+        </p:nvSpPr>
+        <p:spPr>
+          <a:xfrm>
+            <a:off x="3622486" y="891153"/>
+            <a:ext cx="4099114" cy="3693318"/>
+          </a:xfrm>
+          <a:prstGeom prst="rect">
+            <a:avLst/>
+          </a:prstGeom>
+          <a:noFill/>
+          <a:ln w="38100"/>
+        </p:spPr>
+        <p:style>
+          <a:lnRef idx="2">
+            <a:schemeClr val="accent2"/>
+          </a:lnRef>
+          <a:fillRef idx="1">
+            <a:schemeClr val="lt1"/>
+          </a:fillRef>
+          <a:effectRef idx="0">
+            <a:schemeClr val="accent2"/>
+          </a:effectRef>
+          <a:fontRef idx="minor">
+            <a:schemeClr val="dk1"/>
+          </a:fontRef>
+        </p:style>
+        <p:txBody>
+          <a:bodyPr rtlCol="0" anchor="ctr"/>
+          <a:lstStyle/>
+          <a:p>
+            <a:pPr algn="ctr"/>
+            <a:endParaRPr lang="cs-CZ"/>
+          </a:p>
+        </p:txBody>
+      </p:sp>
+    </p:spTree>
+    <p:extLst>
+      <p:ext uri="{BB962C8B-B14F-4D97-AF65-F5344CB8AC3E}">
+        <p14:creationId xmlns:p14="http://schemas.microsoft.com/office/powerpoint/2010/main" val="2267920723"/>
+      </p:ext>
+    </p:extLst>
+  </p:cSld>
+  <p:clrMapOvr>
+    <a:masterClrMapping/>
+  </p:clrMapOvr>
+</p:sld>
+</file>
+
+<file path=ppt/slides/slide11.xml><?xml version="1.0" encoding="utf-8"?>
+<p:sld xmlns:a="http://schemas.openxmlformats.org/drawingml/2006/main" xmlns:r="http://schemas.openxmlformats.org/officeDocument/2006/relationships" xmlns:p="http://schemas.openxmlformats.org/presentationml/2006/main">
+  <p:cSld>
+    <p:spTree>
+      <p:nvGrpSpPr>
+        <p:cNvPr id="1" name=""/>
+        <p:cNvGrpSpPr/>
+        <p:nvPr/>
+      </p:nvGrpSpPr>
+      <p:grpSpPr>
+        <a:xfrm>
+          <a:off x="0" y="0"/>
+          <a:ext cx="0" cy="0"/>
+          <a:chOff x="0" y="0"/>
+          <a:chExt cx="0" cy="0"/>
+        </a:xfrm>
+      </p:grpSpPr>
+      <p:sp>
+        <p:nvSpPr>
+          <p:cNvPr id="2" name="Nadpis 1">
+            <a:extLst>
+              <a:ext uri="{FF2B5EF4-FFF2-40B4-BE49-F238E27FC236}">
+                <a16:creationId xmlns:a16="http://schemas.microsoft.com/office/drawing/2014/main" id="{D1C9534C-3980-F46B-B3EC-B7AB24B9F1E0}"/>
+              </a:ext>
+            </a:extLst>
+          </p:cNvPr>
+          <p:cNvSpPr>
+            <a:spLocks noGrp="1"/>
+          </p:cNvSpPr>
+          <p:nvPr>
+            <p:ph type="title"/>
+          </p:nvPr>
+        </p:nvSpPr>
+        <p:spPr/>
+        <p:txBody>
+          <a:bodyPr/>
+          <a:lstStyle/>
+          <a:p>
+            <a:endParaRPr lang="cs-CZ"/>
+          </a:p>
+        </p:txBody>
+      </p:sp>
+      <p:sp>
+        <p:nvSpPr>
+          <p:cNvPr id="3" name="Zástupný obsah 2">
+            <a:extLst>
+              <a:ext uri="{FF2B5EF4-FFF2-40B4-BE49-F238E27FC236}">
+                <a16:creationId xmlns:a16="http://schemas.microsoft.com/office/drawing/2014/main" id="{5FC78813-8C2E-AFB9-0B40-ED9CC4B018A2}"/>
+              </a:ext>
+            </a:extLst>
+          </p:cNvPr>
+          <p:cNvSpPr>
+            <a:spLocks noGrp="1"/>
+          </p:cNvSpPr>
+          <p:nvPr>
+            <p:ph idx="1"/>
+          </p:nvPr>
+        </p:nvSpPr>
+        <p:spPr/>
+        <p:txBody>
+          <a:bodyPr/>
+          <a:lstStyle/>
+          <a:p>
+            <a:endParaRPr lang="cs-CZ"/>
+          </a:p>
+        </p:txBody>
+      </p:sp>
+      <p:pic>
+        <p:nvPicPr>
+          <p:cNvPr id="5" name="Obrázek 4">
+            <a:extLst>
+              <a:ext uri="{FF2B5EF4-FFF2-40B4-BE49-F238E27FC236}">
+                <a16:creationId xmlns:a16="http://schemas.microsoft.com/office/drawing/2014/main" id="{7757A357-43FB-590D-52DE-29DF3151FDB3}"/>
+              </a:ext>
+            </a:extLst>
+          </p:cNvPr>
+          <p:cNvPicPr>
+            <a:picLocks noChangeAspect="1"/>
+          </p:cNvPicPr>
+          <p:nvPr/>
+        </p:nvPicPr>
+        <p:blipFill>
+          <a:blip r:embed="rId2"/>
+          <a:stretch>
+            <a:fillRect/>
+          </a:stretch>
+        </p:blipFill>
+        <p:spPr>
+          <a:xfrm>
+            <a:off x="0" y="180180"/>
+            <a:ext cx="12192000" cy="6497640"/>
+          </a:xfrm>
+          <a:prstGeom prst="rect">
+            <a:avLst/>
+          </a:prstGeom>
+        </p:spPr>
+      </p:pic>
+      <p:sp>
+        <p:nvSpPr>
+          <p:cNvPr id="4" name="TextovéPole 3">
+            <a:extLst>
+              <a:ext uri="{FF2B5EF4-FFF2-40B4-BE49-F238E27FC236}">
+                <a16:creationId xmlns:a16="http://schemas.microsoft.com/office/drawing/2014/main" id="{A3F98B79-2F99-723B-A14E-2C7944E7CDC7}"/>
+              </a:ext>
+            </a:extLst>
+          </p:cNvPr>
+          <p:cNvSpPr txBox="1"/>
+          <p:nvPr/>
+        </p:nvSpPr>
+        <p:spPr>
+          <a:xfrm>
+            <a:off x="7085429" y="266844"/>
+            <a:ext cx="4268371" cy="1754326"/>
+          </a:xfrm>
+          <a:prstGeom prst="rect">
+            <a:avLst/>
+          </a:prstGeom>
+        </p:spPr>
+        <p:style>
+          <a:lnRef idx="2">
+            <a:schemeClr val="accent2">
+              <a:shade val="50000"/>
+            </a:schemeClr>
+          </a:lnRef>
+          <a:fillRef idx="1">
+            <a:schemeClr val="accent2"/>
+          </a:fillRef>
+          <a:effectRef idx="0">
+            <a:schemeClr val="accent2"/>
+          </a:effectRef>
+          <a:fontRef idx="minor">
+            <a:schemeClr val="lt1"/>
+          </a:fontRef>
+        </p:style>
+        <p:txBody>
+          <a:bodyPr wrap="square" rtlCol="0">
+            <a:spAutoFit/>
+          </a:bodyPr>
+          <a:lstStyle/>
+          <a:p>
+            <a:r>
+              <a:rPr lang="cs-CZ" dirty="0"/>
+              <a:t>Následně si vytvoříme funkce, které zpřístupní vyhledávání poznámek a také zjištění jejich počtu. (Metodu </a:t>
+            </a:r>
+            <a:r>
+              <a:rPr lang="cs-CZ" dirty="0" err="1"/>
+              <a:t>findNotesCount</a:t>
+            </a:r>
+            <a:r>
+              <a:rPr lang="cs-CZ" dirty="0"/>
+              <a:t> budeme potřebovat v budoucnu, až se budeme snažit příspěvky např. rozdělit do více stránek.)</a:t>
+            </a:r>
+          </a:p>
+        </p:txBody>
+      </p:sp>
+      <p:sp>
+        <p:nvSpPr>
+          <p:cNvPr id="6" name="Obdélník 5">
+            <a:extLst>
+              <a:ext uri="{FF2B5EF4-FFF2-40B4-BE49-F238E27FC236}">
+                <a16:creationId xmlns:a16="http://schemas.microsoft.com/office/drawing/2014/main" id="{A0A39046-D7B1-F40B-B6A1-D519150CDE40}"/>
+              </a:ext>
+            </a:extLst>
+          </p:cNvPr>
+          <p:cNvSpPr/>
+          <p:nvPr/>
+        </p:nvSpPr>
+        <p:spPr>
+          <a:xfrm>
+            <a:off x="3622485" y="2216715"/>
+            <a:ext cx="5594086" cy="3631237"/>
+          </a:xfrm>
+          <a:prstGeom prst="rect">
+            <a:avLst/>
+          </a:prstGeom>
+          <a:noFill/>
+          <a:ln w="38100"/>
+        </p:spPr>
+        <p:style>
+          <a:lnRef idx="2">
+            <a:schemeClr val="accent2"/>
+          </a:lnRef>
+          <a:fillRef idx="1">
+            <a:schemeClr val="lt1"/>
+          </a:fillRef>
+          <a:effectRef idx="0">
+            <a:schemeClr val="accent2"/>
+          </a:effectRef>
+          <a:fontRef idx="minor">
+            <a:schemeClr val="dk1"/>
+          </a:fontRef>
+        </p:style>
+        <p:txBody>
+          <a:bodyPr rtlCol="0" anchor="ctr"/>
+          <a:lstStyle/>
+          <a:p>
+            <a:pPr algn="ctr"/>
+            <a:endParaRPr lang="cs-CZ"/>
+          </a:p>
+        </p:txBody>
+      </p:sp>
+    </p:spTree>
+    <p:extLst>
+      <p:ext uri="{BB962C8B-B14F-4D97-AF65-F5344CB8AC3E}">
+        <p14:creationId xmlns:p14="http://schemas.microsoft.com/office/powerpoint/2010/main" val="4272910431"/>
+      </p:ext>
+    </p:extLst>
+  </p:cSld>
+  <p:clrMapOvr>
+    <a:masterClrMapping/>
+  </p:clrMapOvr>
+</p:sld>
+</file>
+
+<file path=ppt/slides/slide12.xml><?xml version="1.0" encoding="utf-8"?>
+<p:sld xmlns:a="http://schemas.openxmlformats.org/drawingml/2006/main" xmlns:r="http://schemas.openxmlformats.org/officeDocument/2006/relationships" xmlns:p="http://schemas.openxmlformats.org/presentationml/2006/main">
+  <p:cSld>
+    <p:spTree>
+      <p:nvGrpSpPr>
+        <p:cNvPr id="1" name=""/>
+        <p:cNvGrpSpPr/>
+        <p:nvPr/>
+      </p:nvGrpSpPr>
+      <p:grpSpPr>
+        <a:xfrm>
+          <a:off x="0" y="0"/>
+          <a:ext cx="0" cy="0"/>
+          <a:chOff x="0" y="0"/>
+          <a:chExt cx="0" cy="0"/>
+        </a:xfrm>
+      </p:grpSpPr>
+      <p:sp>
+        <p:nvSpPr>
+          <p:cNvPr id="2" name="Nadpis 1">
+            <a:extLst>
+              <a:ext uri="{FF2B5EF4-FFF2-40B4-BE49-F238E27FC236}">
+                <a16:creationId xmlns:a16="http://schemas.microsoft.com/office/drawing/2014/main" id="{17EEE662-E805-2316-969C-0720111BFC16}"/>
+              </a:ext>
+            </a:extLst>
+          </p:cNvPr>
+          <p:cNvSpPr>
+            <a:spLocks noGrp="1"/>
+          </p:cNvSpPr>
+          <p:nvPr>
+            <p:ph type="title"/>
+          </p:nvPr>
+        </p:nvSpPr>
+        <p:spPr/>
+        <p:txBody>
+          <a:bodyPr/>
+          <a:lstStyle/>
+          <a:p>
+            <a:endParaRPr lang="cs-CZ"/>
+          </a:p>
+        </p:txBody>
+      </p:sp>
+      <p:sp>
+        <p:nvSpPr>
+          <p:cNvPr id="3" name="Zástupný obsah 2">
+            <a:extLst>
+              <a:ext uri="{FF2B5EF4-FFF2-40B4-BE49-F238E27FC236}">
+                <a16:creationId xmlns:a16="http://schemas.microsoft.com/office/drawing/2014/main" id="{519F9971-C235-5177-BC89-6F28CBA4FAC1}"/>
+              </a:ext>
+            </a:extLst>
+          </p:cNvPr>
+          <p:cNvSpPr>
+            <a:spLocks noGrp="1"/>
+          </p:cNvSpPr>
+          <p:nvPr>
+            <p:ph idx="1"/>
+          </p:nvPr>
+        </p:nvSpPr>
+        <p:spPr/>
+        <p:txBody>
+          <a:bodyPr/>
+          <a:lstStyle/>
+          <a:p>
+            <a:endParaRPr lang="cs-CZ"/>
+          </a:p>
+        </p:txBody>
+      </p:sp>
+      <p:pic>
+        <p:nvPicPr>
+          <p:cNvPr id="5" name="Obrázek 4">
+            <a:extLst>
+              <a:ext uri="{FF2B5EF4-FFF2-40B4-BE49-F238E27FC236}">
+                <a16:creationId xmlns:a16="http://schemas.microsoft.com/office/drawing/2014/main" id="{CF0618A4-7788-2168-961F-0A37FE9766CA}"/>
+              </a:ext>
+            </a:extLst>
+          </p:cNvPr>
+          <p:cNvPicPr>
+            <a:picLocks noChangeAspect="1"/>
+          </p:cNvPicPr>
+          <p:nvPr/>
+        </p:nvPicPr>
+        <p:blipFill>
+          <a:blip r:embed="rId2"/>
+          <a:stretch>
+            <a:fillRect/>
+          </a:stretch>
+        </p:blipFill>
+        <p:spPr>
+          <a:xfrm>
+            <a:off x="0" y="180180"/>
+            <a:ext cx="12192000" cy="6497640"/>
+          </a:xfrm>
+          <a:prstGeom prst="rect">
+            <a:avLst/>
+          </a:prstGeom>
+        </p:spPr>
+      </p:pic>
+      <p:sp>
+        <p:nvSpPr>
+          <p:cNvPr id="4" name="TextovéPole 3">
+            <a:extLst>
+              <a:ext uri="{FF2B5EF4-FFF2-40B4-BE49-F238E27FC236}">
+                <a16:creationId xmlns:a16="http://schemas.microsoft.com/office/drawing/2014/main" id="{4193EF75-6AE8-C791-7388-05AA4FF477F0}"/>
+              </a:ext>
+            </a:extLst>
+          </p:cNvPr>
+          <p:cNvSpPr txBox="1"/>
+          <p:nvPr/>
+        </p:nvSpPr>
+        <p:spPr>
+          <a:xfrm>
+            <a:off x="7085429" y="4098924"/>
+            <a:ext cx="4268371" cy="1477328"/>
+          </a:xfrm>
+          <a:prstGeom prst="rect">
+            <a:avLst/>
+          </a:prstGeom>
+        </p:spPr>
+        <p:style>
+          <a:lnRef idx="2">
+            <a:schemeClr val="accent2">
+              <a:shade val="50000"/>
+            </a:schemeClr>
+          </a:lnRef>
+          <a:fillRef idx="1">
+            <a:schemeClr val="accent2"/>
+          </a:fillRef>
+          <a:effectRef idx="0">
+            <a:schemeClr val="accent2"/>
+          </a:effectRef>
+          <a:fontRef idx="minor">
+            <a:schemeClr val="lt1"/>
+          </a:fontRef>
+        </p:style>
+        <p:txBody>
+          <a:bodyPr wrap="square" rtlCol="0">
+            <a:spAutoFit/>
+          </a:bodyPr>
+          <a:lstStyle/>
+          <a:p>
+            <a:r>
+              <a:rPr lang="cs-CZ" dirty="0"/>
+              <a:t>Posledním krokem, který musíme pro „zprovoznění“ </a:t>
+            </a:r>
+            <a:r>
+              <a:rPr lang="cs-CZ" dirty="0" err="1"/>
+              <a:t>NotesFacade</a:t>
+            </a:r>
+            <a:r>
+              <a:rPr lang="cs-CZ" dirty="0"/>
+              <a:t> udělat, je zapsání této třídy mezi automaticky vytvářené služby. Službu tedy zapíšeme do </a:t>
+            </a:r>
+            <a:r>
+              <a:rPr lang="cs-CZ" dirty="0" err="1"/>
+              <a:t>common.neon</a:t>
+            </a:r>
+            <a:r>
+              <a:rPr lang="cs-CZ" dirty="0"/>
+              <a:t>.</a:t>
+            </a:r>
+          </a:p>
+        </p:txBody>
+      </p:sp>
+      <p:sp>
+        <p:nvSpPr>
+          <p:cNvPr id="6" name="Obdélník 5">
+            <a:extLst>
+              <a:ext uri="{FF2B5EF4-FFF2-40B4-BE49-F238E27FC236}">
+                <a16:creationId xmlns:a16="http://schemas.microsoft.com/office/drawing/2014/main" id="{FB4A67F4-361E-5FF2-4410-3AA967875A0F}"/>
+              </a:ext>
+            </a:extLst>
+          </p:cNvPr>
+          <p:cNvSpPr/>
+          <p:nvPr/>
+        </p:nvSpPr>
+        <p:spPr>
+          <a:xfrm>
+            <a:off x="3810584" y="4426856"/>
+            <a:ext cx="2517643" cy="333830"/>
+          </a:xfrm>
+          <a:prstGeom prst="rect">
+            <a:avLst/>
+          </a:prstGeom>
+          <a:noFill/>
+          <a:ln w="38100"/>
+        </p:spPr>
+        <p:style>
+          <a:lnRef idx="2">
+            <a:schemeClr val="accent2"/>
+          </a:lnRef>
+          <a:fillRef idx="1">
+            <a:schemeClr val="lt1"/>
+          </a:fillRef>
+          <a:effectRef idx="0">
+            <a:schemeClr val="accent2"/>
+          </a:effectRef>
+          <a:fontRef idx="minor">
+            <a:schemeClr val="dk1"/>
+          </a:fontRef>
+        </p:style>
+        <p:txBody>
+          <a:bodyPr rtlCol="0" anchor="ctr"/>
+          <a:lstStyle/>
+          <a:p>
+            <a:pPr algn="ctr"/>
+            <a:endParaRPr lang="cs-CZ"/>
+          </a:p>
+        </p:txBody>
+      </p:sp>
+    </p:spTree>
+    <p:extLst>
+      <p:ext uri="{BB962C8B-B14F-4D97-AF65-F5344CB8AC3E}">
+        <p14:creationId xmlns:p14="http://schemas.microsoft.com/office/powerpoint/2010/main" val="86116261"/>
+      </p:ext>
+    </p:extLst>
+  </p:cSld>
+  <p:clrMapOvr>
+    <a:masterClrMapping/>
+  </p:clrMapOvr>
+</p:sld>
+</file>
+
+<file path=ppt/slides/slide13.xml><?xml version="1.0" encoding="utf-8"?>
+<p:sld xmlns:a="http://schemas.openxmlformats.org/drawingml/2006/main" xmlns:r="http://schemas.openxmlformats.org/officeDocument/2006/relationships" xmlns:p="http://schemas.openxmlformats.org/presentationml/2006/main">
+  <p:cSld>
+    <p:spTree>
+      <p:nvGrpSpPr>
+        <p:cNvPr id="1" name=""/>
+        <p:cNvGrpSpPr/>
+        <p:nvPr/>
+      </p:nvGrpSpPr>
+      <p:grpSpPr>
+        <a:xfrm>
+          <a:off x="0" y="0"/>
+          <a:ext cx="0" cy="0"/>
+          <a:chOff x="0" y="0"/>
+          <a:chExt cx="0" cy="0"/>
+        </a:xfrm>
+      </p:grpSpPr>
+      <p:sp>
+        <p:nvSpPr>
+          <p:cNvPr id="2" name="Nadpis 1">
+            <a:extLst>
+              <a:ext uri="{FF2B5EF4-FFF2-40B4-BE49-F238E27FC236}">
+                <a16:creationId xmlns:a16="http://schemas.microsoft.com/office/drawing/2014/main" id="{34590A2F-BA16-AFAE-4741-796E31D22F00}"/>
+              </a:ext>
+            </a:extLst>
+          </p:cNvPr>
+          <p:cNvSpPr>
+            <a:spLocks noGrp="1"/>
+          </p:cNvSpPr>
+          <p:nvPr>
+            <p:ph type="title"/>
+          </p:nvPr>
+        </p:nvSpPr>
+        <p:spPr/>
+        <p:txBody>
+          <a:bodyPr/>
+          <a:lstStyle/>
+          <a:p>
+            <a:endParaRPr lang="cs-CZ"/>
+          </a:p>
+        </p:txBody>
+      </p:sp>
+      <p:sp>
+        <p:nvSpPr>
+          <p:cNvPr id="3" name="Zástupný obsah 2">
+            <a:extLst>
+              <a:ext uri="{FF2B5EF4-FFF2-40B4-BE49-F238E27FC236}">
+                <a16:creationId xmlns:a16="http://schemas.microsoft.com/office/drawing/2014/main" id="{61A8651B-C684-7940-D516-23C7DF68889B}"/>
+              </a:ext>
+            </a:extLst>
+          </p:cNvPr>
+          <p:cNvSpPr>
+            <a:spLocks noGrp="1"/>
+          </p:cNvSpPr>
+          <p:nvPr>
+            <p:ph idx="1"/>
+          </p:nvPr>
+        </p:nvSpPr>
+        <p:spPr/>
+        <p:txBody>
+          <a:bodyPr/>
+          <a:lstStyle/>
+          <a:p>
+            <a:endParaRPr lang="cs-CZ"/>
+          </a:p>
+        </p:txBody>
+      </p:sp>
+      <p:pic>
+        <p:nvPicPr>
+          <p:cNvPr id="7" name="Obrázek 6">
+            <a:extLst>
+              <a:ext uri="{FF2B5EF4-FFF2-40B4-BE49-F238E27FC236}">
+                <a16:creationId xmlns:a16="http://schemas.microsoft.com/office/drawing/2014/main" id="{095D109B-CE90-E063-B466-D92CC719E6F6}"/>
+              </a:ext>
+            </a:extLst>
+          </p:cNvPr>
+          <p:cNvPicPr>
+            <a:picLocks noChangeAspect="1"/>
+          </p:cNvPicPr>
+          <p:nvPr/>
+        </p:nvPicPr>
+        <p:blipFill>
+          <a:blip r:embed="rId2"/>
+          <a:stretch>
+            <a:fillRect/>
+          </a:stretch>
+        </p:blipFill>
+        <p:spPr>
+          <a:xfrm>
+            <a:off x="0" y="180180"/>
+            <a:ext cx="12192000" cy="6497640"/>
+          </a:xfrm>
+          <a:prstGeom prst="rect">
+            <a:avLst/>
+          </a:prstGeom>
+        </p:spPr>
+      </p:pic>
+      <p:sp>
+        <p:nvSpPr>
+          <p:cNvPr id="4" name="TextovéPole 3">
+            <a:extLst>
+              <a:ext uri="{FF2B5EF4-FFF2-40B4-BE49-F238E27FC236}">
+                <a16:creationId xmlns:a16="http://schemas.microsoft.com/office/drawing/2014/main" id="{ACA1B234-3327-16D8-BB2B-173E3D3D7AF2}"/>
+              </a:ext>
+            </a:extLst>
+          </p:cNvPr>
+          <p:cNvSpPr txBox="1"/>
+          <p:nvPr/>
+        </p:nvSpPr>
+        <p:spPr>
+          <a:xfrm>
+            <a:off x="7836545" y="3004457"/>
+            <a:ext cx="4268371" cy="1477328"/>
+          </a:xfrm>
+          <a:prstGeom prst="rect">
+            <a:avLst/>
+          </a:prstGeom>
+        </p:spPr>
+        <p:style>
+          <a:lnRef idx="2">
+            <a:schemeClr val="accent2">
+              <a:shade val="50000"/>
+            </a:schemeClr>
+          </a:lnRef>
+          <a:fillRef idx="1">
+            <a:schemeClr val="accent2"/>
+          </a:fillRef>
+          <a:effectRef idx="0">
+            <a:schemeClr val="accent2"/>
+          </a:effectRef>
+          <a:fontRef idx="minor">
+            <a:schemeClr val="lt1"/>
+          </a:fontRef>
+        </p:style>
+        <p:txBody>
+          <a:bodyPr wrap="square" rtlCol="0">
+            <a:spAutoFit/>
+          </a:bodyPr>
+          <a:lstStyle/>
+          <a:p>
+            <a:r>
+              <a:rPr lang="cs-CZ" dirty="0"/>
+              <a:t>A můžeme se vrhnout na úpravu </a:t>
+            </a:r>
+            <a:r>
+              <a:rPr lang="cs-CZ" dirty="0" err="1"/>
+              <a:t>presenteru</a:t>
+            </a:r>
+            <a:r>
+              <a:rPr lang="cs-CZ" dirty="0"/>
+              <a:t>. Využijeme již existující </a:t>
+            </a:r>
+            <a:r>
+              <a:rPr lang="cs-CZ" dirty="0" err="1"/>
+              <a:t>HomepagePresenter</a:t>
+            </a:r>
+            <a:r>
+              <a:rPr lang="cs-CZ" dirty="0"/>
+              <a:t>, do kterého si doplníme požadavek na získání instance </a:t>
+            </a:r>
+            <a:r>
+              <a:rPr lang="cs-CZ" dirty="0" err="1"/>
+              <a:t>NotesFacade</a:t>
+            </a:r>
+            <a:r>
+              <a:rPr lang="cs-CZ" dirty="0"/>
+              <a:t>. </a:t>
+            </a:r>
+          </a:p>
+        </p:txBody>
+      </p:sp>
+      <p:sp>
+        <p:nvSpPr>
+          <p:cNvPr id="5" name="Obdélník 4">
+            <a:extLst>
+              <a:ext uri="{FF2B5EF4-FFF2-40B4-BE49-F238E27FC236}">
+                <a16:creationId xmlns:a16="http://schemas.microsoft.com/office/drawing/2014/main" id="{3824CD76-878B-D34F-491F-FB97A3BF7BE2}"/>
+              </a:ext>
+            </a:extLst>
+          </p:cNvPr>
+          <p:cNvSpPr/>
+          <p:nvPr/>
+        </p:nvSpPr>
+        <p:spPr>
+          <a:xfrm>
+            <a:off x="3622486" y="3004457"/>
+            <a:ext cx="4099114" cy="1580014"/>
+          </a:xfrm>
+          <a:prstGeom prst="rect">
+            <a:avLst/>
+          </a:prstGeom>
+          <a:noFill/>
+          <a:ln w="38100"/>
+        </p:spPr>
+        <p:style>
+          <a:lnRef idx="2">
+            <a:schemeClr val="accent2"/>
+          </a:lnRef>
+          <a:fillRef idx="1">
+            <a:schemeClr val="lt1"/>
+          </a:fillRef>
+          <a:effectRef idx="0">
+            <a:schemeClr val="accent2"/>
+          </a:effectRef>
+          <a:fontRef idx="minor">
+            <a:schemeClr val="dk1"/>
+          </a:fontRef>
+        </p:style>
+        <p:txBody>
+          <a:bodyPr rtlCol="0" anchor="ctr"/>
+          <a:lstStyle/>
+          <a:p>
+            <a:pPr algn="ctr"/>
+            <a:endParaRPr lang="cs-CZ"/>
+          </a:p>
+        </p:txBody>
+      </p:sp>
+    </p:spTree>
+    <p:extLst>
+      <p:ext uri="{BB962C8B-B14F-4D97-AF65-F5344CB8AC3E}">
+        <p14:creationId xmlns:p14="http://schemas.microsoft.com/office/powerpoint/2010/main" val="2209711828"/>
+      </p:ext>
+    </p:extLst>
+  </p:cSld>
+  <p:clrMapOvr>
+    <a:masterClrMapping/>
+  </p:clrMapOvr>
+</p:sld>
+</file>
+
+<file path=ppt/slides/slide14.xml><?xml version="1.0" encoding="utf-8"?>
+<p:sld xmlns:a="http://schemas.openxmlformats.org/drawingml/2006/main" xmlns:r="http://schemas.openxmlformats.org/officeDocument/2006/relationships" xmlns:p="http://schemas.openxmlformats.org/presentationml/2006/main">
+  <p:cSld>
+    <p:spTree>
+      <p:nvGrpSpPr>
+        <p:cNvPr id="1" name=""/>
+        <p:cNvGrpSpPr/>
+        <p:nvPr/>
+      </p:nvGrpSpPr>
+      <p:grpSpPr>
+        <a:xfrm>
+          <a:off x="0" y="0"/>
+          <a:ext cx="0" cy="0"/>
+          <a:chOff x="0" y="0"/>
+          <a:chExt cx="0" cy="0"/>
+        </a:xfrm>
+      </p:grpSpPr>
+      <p:sp>
+        <p:nvSpPr>
+          <p:cNvPr id="2" name="Nadpis 1">
+            <a:extLst>
+              <a:ext uri="{FF2B5EF4-FFF2-40B4-BE49-F238E27FC236}">
+                <a16:creationId xmlns:a16="http://schemas.microsoft.com/office/drawing/2014/main" id="{7161B84D-9B6F-EB92-D414-B1EF305CC741}"/>
+              </a:ext>
+            </a:extLst>
+          </p:cNvPr>
+          <p:cNvSpPr>
+            <a:spLocks noGrp="1"/>
+          </p:cNvSpPr>
+          <p:nvPr>
+            <p:ph type="title"/>
+          </p:nvPr>
+        </p:nvSpPr>
+        <p:spPr/>
+        <p:txBody>
+          <a:bodyPr/>
+          <a:lstStyle/>
+          <a:p>
+            <a:endParaRPr lang="cs-CZ"/>
+          </a:p>
+        </p:txBody>
+      </p:sp>
+      <p:sp>
+        <p:nvSpPr>
+          <p:cNvPr id="3" name="Zástupný obsah 2">
+            <a:extLst>
+              <a:ext uri="{FF2B5EF4-FFF2-40B4-BE49-F238E27FC236}">
+                <a16:creationId xmlns:a16="http://schemas.microsoft.com/office/drawing/2014/main" id="{CBD1CBC6-B7EF-CB9A-6EA9-2A2ACAFA35D7}"/>
+              </a:ext>
+            </a:extLst>
+          </p:cNvPr>
+          <p:cNvSpPr>
+            <a:spLocks noGrp="1"/>
+          </p:cNvSpPr>
+          <p:nvPr>
+            <p:ph idx="1"/>
+          </p:nvPr>
+        </p:nvSpPr>
+        <p:spPr/>
+        <p:txBody>
+          <a:bodyPr/>
+          <a:lstStyle/>
+          <a:p>
+            <a:endParaRPr lang="cs-CZ"/>
+          </a:p>
+        </p:txBody>
+      </p:sp>
+      <p:pic>
+        <p:nvPicPr>
+          <p:cNvPr id="5" name="Obrázek 4">
+            <a:extLst>
+              <a:ext uri="{FF2B5EF4-FFF2-40B4-BE49-F238E27FC236}">
+                <a16:creationId xmlns:a16="http://schemas.microsoft.com/office/drawing/2014/main" id="{7B37E98B-4056-CB55-479A-5FEA44DF010E}"/>
+              </a:ext>
+            </a:extLst>
+          </p:cNvPr>
+          <p:cNvPicPr>
+            <a:picLocks noChangeAspect="1"/>
+          </p:cNvPicPr>
+          <p:nvPr/>
+        </p:nvPicPr>
+        <p:blipFill>
+          <a:blip r:embed="rId2"/>
+          <a:stretch>
+            <a:fillRect/>
+          </a:stretch>
+        </p:blipFill>
+        <p:spPr>
+          <a:xfrm>
+            <a:off x="0" y="180180"/>
+            <a:ext cx="12192000" cy="6497640"/>
+          </a:xfrm>
+          <a:prstGeom prst="rect">
+            <a:avLst/>
+          </a:prstGeom>
+        </p:spPr>
+      </p:pic>
+      <p:sp>
+        <p:nvSpPr>
+          <p:cNvPr id="4" name="TextovéPole 3">
+            <a:extLst>
+              <a:ext uri="{FF2B5EF4-FFF2-40B4-BE49-F238E27FC236}">
+                <a16:creationId xmlns:a16="http://schemas.microsoft.com/office/drawing/2014/main" id="{547D0762-4735-BCE2-4688-61367DC288A7}"/>
+              </a:ext>
+            </a:extLst>
+          </p:cNvPr>
+          <p:cNvSpPr txBox="1"/>
+          <p:nvPr/>
+        </p:nvSpPr>
+        <p:spPr>
+          <a:xfrm>
+            <a:off x="7837712" y="3116262"/>
+            <a:ext cx="4268371" cy="2031325"/>
+          </a:xfrm>
+          <a:prstGeom prst="rect">
+            <a:avLst/>
+          </a:prstGeom>
+        </p:spPr>
+        <p:style>
+          <a:lnRef idx="2">
+            <a:schemeClr val="accent2">
+              <a:shade val="50000"/>
+            </a:schemeClr>
+          </a:lnRef>
+          <a:fillRef idx="1">
+            <a:schemeClr val="accent2"/>
+          </a:fillRef>
+          <a:effectRef idx="0">
+            <a:schemeClr val="accent2"/>
+          </a:effectRef>
+          <a:fontRef idx="minor">
+            <a:schemeClr val="lt1"/>
+          </a:fontRef>
+        </p:style>
+        <p:txBody>
+          <a:bodyPr wrap="square" rtlCol="0">
+            <a:spAutoFit/>
+          </a:bodyPr>
+          <a:lstStyle/>
+          <a:p>
+            <a:r>
+              <a:rPr lang="cs-CZ" dirty="0"/>
+              <a:t>Poté již můžeme tuto novou fasádu využívat v jednotlivých akcích. </a:t>
+            </a:r>
+          </a:p>
+          <a:p>
+            <a:endParaRPr lang="cs-CZ" dirty="0"/>
+          </a:p>
+          <a:p>
+            <a:r>
+              <a:rPr lang="cs-CZ" dirty="0"/>
+              <a:t>Pro výpis poznámek na </a:t>
+            </a:r>
+            <a:r>
+              <a:rPr lang="cs-CZ" dirty="0" err="1"/>
+              <a:t>homepage</a:t>
+            </a:r>
+            <a:r>
+              <a:rPr lang="cs-CZ" dirty="0"/>
+              <a:t> bude stačit, když doplníme metodu </a:t>
+            </a:r>
+            <a:r>
+              <a:rPr lang="cs-CZ" dirty="0" err="1"/>
+              <a:t>renderDefault</a:t>
+            </a:r>
+            <a:r>
+              <a:rPr lang="cs-CZ" dirty="0"/>
+              <a:t>, ve které si do šablony předáme seznam všech poznámek.</a:t>
+            </a:r>
+          </a:p>
+        </p:txBody>
+      </p:sp>
+      <p:sp>
+        <p:nvSpPr>
+          <p:cNvPr id="6" name="Obdélník 5">
+            <a:extLst>
+              <a:ext uri="{FF2B5EF4-FFF2-40B4-BE49-F238E27FC236}">
+                <a16:creationId xmlns:a16="http://schemas.microsoft.com/office/drawing/2014/main" id="{0B4ADB35-2616-8C26-3A64-1EB821690451}"/>
+              </a:ext>
+            </a:extLst>
+          </p:cNvPr>
+          <p:cNvSpPr/>
+          <p:nvPr/>
+        </p:nvSpPr>
+        <p:spPr>
+          <a:xfrm>
+            <a:off x="3622486" y="3323771"/>
+            <a:ext cx="4099114" cy="769258"/>
+          </a:xfrm>
+          <a:prstGeom prst="rect">
+            <a:avLst/>
+          </a:prstGeom>
+          <a:noFill/>
+          <a:ln w="38100"/>
+        </p:spPr>
+        <p:style>
+          <a:lnRef idx="2">
+            <a:schemeClr val="accent2"/>
+          </a:lnRef>
+          <a:fillRef idx="1">
+            <a:schemeClr val="lt1"/>
+          </a:fillRef>
+          <a:effectRef idx="0">
+            <a:schemeClr val="accent2"/>
+          </a:effectRef>
+          <a:fontRef idx="minor">
+            <a:schemeClr val="dk1"/>
+          </a:fontRef>
+        </p:style>
+        <p:txBody>
+          <a:bodyPr rtlCol="0" anchor="ctr"/>
+          <a:lstStyle/>
+          <a:p>
+            <a:pPr algn="ctr"/>
+            <a:endParaRPr lang="cs-CZ"/>
+          </a:p>
+        </p:txBody>
+      </p:sp>
+    </p:spTree>
+    <p:extLst>
+      <p:ext uri="{BB962C8B-B14F-4D97-AF65-F5344CB8AC3E}">
+        <p14:creationId xmlns:p14="http://schemas.microsoft.com/office/powerpoint/2010/main" val="3341116277"/>
+      </p:ext>
+    </p:extLst>
+  </p:cSld>
+  <p:clrMapOvr>
+    <a:masterClrMapping/>
+  </p:clrMapOvr>
+</p:sld>
+</file>
+
+<file path=ppt/slides/slide15.xml><?xml version="1.0" encoding="utf-8"?>
+<p:sld xmlns:a="http://schemas.openxmlformats.org/drawingml/2006/main" xmlns:r="http://schemas.openxmlformats.org/officeDocument/2006/relationships" xmlns:p="http://schemas.openxmlformats.org/presentationml/2006/main">
+  <p:cSld>
+    <p:spTree>
+      <p:nvGrpSpPr>
+        <p:cNvPr id="1" name=""/>
+        <p:cNvGrpSpPr/>
+        <p:nvPr/>
+      </p:nvGrpSpPr>
+      <p:grpSpPr>
+        <a:xfrm>
+          <a:off x="0" y="0"/>
+          <a:ext cx="0" cy="0"/>
+          <a:chOff x="0" y="0"/>
+          <a:chExt cx="0" cy="0"/>
+        </a:xfrm>
+      </p:grpSpPr>
+      <p:sp>
+        <p:nvSpPr>
+          <p:cNvPr id="2" name="Nadpis 1">
+            <a:extLst>
+              <a:ext uri="{FF2B5EF4-FFF2-40B4-BE49-F238E27FC236}">
+                <a16:creationId xmlns:a16="http://schemas.microsoft.com/office/drawing/2014/main" id="{4DFF5776-7C66-6774-330C-35B390519D52}"/>
+              </a:ext>
+            </a:extLst>
+          </p:cNvPr>
+          <p:cNvSpPr>
+            <a:spLocks noGrp="1"/>
+          </p:cNvSpPr>
+          <p:nvPr>
+            <p:ph type="title"/>
+          </p:nvPr>
+        </p:nvSpPr>
+        <p:spPr/>
+        <p:txBody>
+          <a:bodyPr/>
+          <a:lstStyle/>
+          <a:p>
+            <a:endParaRPr lang="cs-CZ"/>
+          </a:p>
+        </p:txBody>
+      </p:sp>
+      <p:sp>
+        <p:nvSpPr>
+          <p:cNvPr id="3" name="Zástupný obsah 2">
+            <a:extLst>
+              <a:ext uri="{FF2B5EF4-FFF2-40B4-BE49-F238E27FC236}">
+                <a16:creationId xmlns:a16="http://schemas.microsoft.com/office/drawing/2014/main" id="{B1C17934-2918-DC3D-3153-8E33D006F6CD}"/>
+              </a:ext>
+            </a:extLst>
+          </p:cNvPr>
+          <p:cNvSpPr>
+            <a:spLocks noGrp="1"/>
+          </p:cNvSpPr>
+          <p:nvPr>
+            <p:ph idx="1"/>
+          </p:nvPr>
+        </p:nvSpPr>
+        <p:spPr/>
+        <p:txBody>
+          <a:bodyPr/>
+          <a:lstStyle/>
+          <a:p>
+            <a:endParaRPr lang="cs-CZ"/>
+          </a:p>
+        </p:txBody>
+      </p:sp>
+      <p:pic>
+        <p:nvPicPr>
+          <p:cNvPr id="5" name="Obrázek 4">
+            <a:extLst>
+              <a:ext uri="{FF2B5EF4-FFF2-40B4-BE49-F238E27FC236}">
+                <a16:creationId xmlns:a16="http://schemas.microsoft.com/office/drawing/2014/main" id="{33EC9DB1-AE6E-A051-CA43-A1E28D207048}"/>
+              </a:ext>
+            </a:extLst>
+          </p:cNvPr>
+          <p:cNvPicPr>
+            <a:picLocks noChangeAspect="1"/>
+          </p:cNvPicPr>
+          <p:nvPr/>
+        </p:nvPicPr>
+        <p:blipFill>
+          <a:blip r:embed="rId2"/>
+          <a:stretch>
+            <a:fillRect/>
+          </a:stretch>
+        </p:blipFill>
+        <p:spPr>
+          <a:xfrm>
+            <a:off x="0" y="180180"/>
+            <a:ext cx="12192000" cy="6497640"/>
+          </a:xfrm>
+          <a:prstGeom prst="rect">
+            <a:avLst/>
+          </a:prstGeom>
+        </p:spPr>
+      </p:pic>
+      <p:sp>
+        <p:nvSpPr>
+          <p:cNvPr id="4" name="TextovéPole 3">
+            <a:extLst>
+              <a:ext uri="{FF2B5EF4-FFF2-40B4-BE49-F238E27FC236}">
+                <a16:creationId xmlns:a16="http://schemas.microsoft.com/office/drawing/2014/main" id="{FC2D52E7-21FD-D749-B147-839E1B8E6856}"/>
+              </a:ext>
+            </a:extLst>
+          </p:cNvPr>
+          <p:cNvSpPr txBox="1"/>
+          <p:nvPr/>
+        </p:nvSpPr>
+        <p:spPr>
+          <a:xfrm>
+            <a:off x="7213014" y="2052296"/>
+            <a:ext cx="4268371" cy="1754326"/>
+          </a:xfrm>
+          <a:prstGeom prst="rect">
+            <a:avLst/>
+          </a:prstGeom>
+        </p:spPr>
+        <p:style>
+          <a:lnRef idx="2">
+            <a:schemeClr val="accent2">
+              <a:shade val="50000"/>
+            </a:schemeClr>
+          </a:lnRef>
+          <a:fillRef idx="1">
+            <a:schemeClr val="accent2"/>
+          </a:fillRef>
+          <a:effectRef idx="0">
+            <a:schemeClr val="accent2"/>
+          </a:effectRef>
+          <a:fontRef idx="minor">
+            <a:schemeClr val="lt1"/>
+          </a:fontRef>
+        </p:style>
+        <p:txBody>
+          <a:bodyPr wrap="square" rtlCol="0">
+            <a:spAutoFit/>
+          </a:bodyPr>
+          <a:lstStyle/>
+          <a:p>
+            <a:r>
+              <a:rPr lang="cs-CZ" dirty="0"/>
+              <a:t>V příslušné šabloně poté doporučuji doplnění „nápovědy“, že tam máme k dispozici pole s poznámkami.</a:t>
+            </a:r>
+          </a:p>
+          <a:p>
+            <a:endParaRPr lang="cs-CZ" dirty="0">
+              <a:solidFill>
+                <a:srgbClr val="FFFF00"/>
+              </a:solidFill>
+            </a:endParaRPr>
+          </a:p>
+          <a:p>
+            <a:r>
+              <a:rPr lang="cs-CZ" dirty="0">
+                <a:solidFill>
+                  <a:srgbClr val="FFFF00"/>
+                </a:solidFill>
+              </a:rPr>
+              <a:t>Zkuste si prosím doplnit výpis všech poznámek pomocí </a:t>
+            </a:r>
+            <a:r>
+              <a:rPr lang="cs-CZ" dirty="0" err="1">
+                <a:solidFill>
+                  <a:srgbClr val="FFFF00"/>
+                </a:solidFill>
+              </a:rPr>
+              <a:t>foreach</a:t>
+            </a:r>
+            <a:r>
+              <a:rPr lang="cs-CZ" dirty="0">
+                <a:solidFill>
+                  <a:srgbClr val="FFFF00"/>
+                </a:solidFill>
+              </a:rPr>
+              <a:t> cyklu.</a:t>
+            </a:r>
+          </a:p>
+        </p:txBody>
+      </p:sp>
+      <p:sp>
+        <p:nvSpPr>
+          <p:cNvPr id="6" name="Obdélník 5">
+            <a:extLst>
+              <a:ext uri="{FF2B5EF4-FFF2-40B4-BE49-F238E27FC236}">
+                <a16:creationId xmlns:a16="http://schemas.microsoft.com/office/drawing/2014/main" id="{0C9D9F64-78DB-842A-53B1-3C5CA4486766}"/>
+              </a:ext>
+            </a:extLst>
+          </p:cNvPr>
+          <p:cNvSpPr/>
+          <p:nvPr/>
+        </p:nvSpPr>
+        <p:spPr>
+          <a:xfrm>
+            <a:off x="3549915" y="887415"/>
+            <a:ext cx="2792828" cy="259214"/>
+          </a:xfrm>
+          <a:prstGeom prst="rect">
+            <a:avLst/>
+          </a:prstGeom>
+          <a:noFill/>
+          <a:ln w="38100"/>
+        </p:spPr>
+        <p:style>
+          <a:lnRef idx="2">
+            <a:schemeClr val="accent2"/>
+          </a:lnRef>
+          <a:fillRef idx="1">
+            <a:schemeClr val="lt1"/>
+          </a:fillRef>
+          <a:effectRef idx="0">
+            <a:schemeClr val="accent2"/>
+          </a:effectRef>
+          <a:fontRef idx="minor">
+            <a:schemeClr val="dk1"/>
+          </a:fontRef>
+        </p:style>
+        <p:txBody>
+          <a:bodyPr rtlCol="0" anchor="ctr"/>
+          <a:lstStyle/>
+          <a:p>
+            <a:pPr algn="ctr"/>
+            <a:endParaRPr lang="cs-CZ"/>
+          </a:p>
+        </p:txBody>
+      </p:sp>
+    </p:spTree>
+    <p:extLst>
+      <p:ext uri="{BB962C8B-B14F-4D97-AF65-F5344CB8AC3E}">
+        <p14:creationId xmlns:p14="http://schemas.microsoft.com/office/powerpoint/2010/main" val="2129988774"/>
+      </p:ext>
+    </p:extLst>
+  </p:cSld>
+  <p:clrMapOvr>
+    <a:masterClrMapping/>
+  </p:clrMapOvr>
+</p:sld>
+</file>
+
 <file path=ppt/slides/slide2.xml><?xml version="1.0" encoding="utf-8"?>
 <p:sld xmlns:a="http://schemas.openxmlformats.org/drawingml/2006/main" xmlns:r="http://schemas.openxmlformats.org/officeDocument/2006/relationships" xmlns:p="http://schemas.openxmlformats.org/presentationml/2006/main">
   <p:cSld>
@@ -3916,10 +5365,10 @@
       </p:sp>
       <p:pic>
         <p:nvPicPr>
-          <p:cNvPr id="5" name="Obrázek 4">
-            <a:extLst>
-              <a:ext uri="{FF2B5EF4-FFF2-40B4-BE49-F238E27FC236}">
-                <a16:creationId xmlns:a16="http://schemas.microsoft.com/office/drawing/2014/main" id="{48073142-7D21-49DB-9EC7-4B99BF6198C0}"/>
+          <p:cNvPr id="8" name="Obrázek 7">
+            <a:extLst>
+              <a:ext uri="{FF2B5EF4-FFF2-40B4-BE49-F238E27FC236}">
+                <a16:creationId xmlns:a16="http://schemas.microsoft.com/office/drawing/2014/main" id="{687C2A31-1AC0-6D6A-53B5-EDA945B94C32}"/>
               </a:ext>
             </a:extLst>
           </p:cNvPr>
@@ -3958,7 +5407,7 @@
         </p:nvSpPr>
         <p:spPr>
           <a:xfrm>
-            <a:off x="365759" y="1225421"/>
+            <a:off x="365759" y="1109309"/>
             <a:ext cx="2658795" cy="1925742"/>
           </a:xfrm>
           <a:prstGeom prst="rect">
@@ -5028,6 +6477,115 @@
     <p:extLst>
       <p:ext uri="{BB962C8B-B14F-4D97-AF65-F5344CB8AC3E}">
         <p14:creationId xmlns:p14="http://schemas.microsoft.com/office/powerpoint/2010/main" val="3805899375"/>
+      </p:ext>
+    </p:extLst>
+  </p:cSld>
+  <p:clrMapOvr>
+    <a:masterClrMapping/>
+  </p:clrMapOvr>
+</p:sld>
+</file>
+
+<file path=ppt/slides/slide9.xml><?xml version="1.0" encoding="utf-8"?>
+<p:sld xmlns:a="http://schemas.openxmlformats.org/drawingml/2006/main" xmlns:r="http://schemas.openxmlformats.org/officeDocument/2006/relationships" xmlns:p="http://schemas.openxmlformats.org/presentationml/2006/main">
+  <p:cSld>
+    <p:spTree>
+      <p:nvGrpSpPr>
+        <p:cNvPr id="1" name=""/>
+        <p:cNvGrpSpPr/>
+        <p:nvPr/>
+      </p:nvGrpSpPr>
+      <p:grpSpPr>
+        <a:xfrm>
+          <a:off x="0" y="0"/>
+          <a:ext cx="0" cy="0"/>
+          <a:chOff x="0" y="0"/>
+          <a:chExt cx="0" cy="0"/>
+        </a:xfrm>
+      </p:grpSpPr>
+      <p:sp>
+        <p:nvSpPr>
+          <p:cNvPr id="2" name="Nadpis 1">
+            <a:extLst>
+              <a:ext uri="{FF2B5EF4-FFF2-40B4-BE49-F238E27FC236}">
+                <a16:creationId xmlns:a16="http://schemas.microsoft.com/office/drawing/2014/main" id="{609E3ADE-E037-731A-C712-BFE26F4E8F3B}"/>
+              </a:ext>
+            </a:extLst>
+          </p:cNvPr>
+          <p:cNvSpPr>
+            <a:spLocks noGrp="1"/>
+          </p:cNvSpPr>
+          <p:nvPr>
+            <p:ph type="title"/>
+          </p:nvPr>
+        </p:nvSpPr>
+        <p:spPr/>
+        <p:txBody>
+          <a:bodyPr/>
+          <a:lstStyle/>
+          <a:p>
+            <a:r>
+              <a:rPr lang="cs-CZ" dirty="0"/>
+              <a:t>Vytvoření </a:t>
+            </a:r>
+            <a:r>
+              <a:rPr lang="cs-CZ" dirty="0" err="1"/>
+              <a:t>NotesFacade</a:t>
+            </a:r>
+            <a:endParaRPr lang="cs-CZ" dirty="0"/>
+          </a:p>
+        </p:txBody>
+      </p:sp>
+      <p:sp>
+        <p:nvSpPr>
+          <p:cNvPr id="3" name="Zástupný obsah 2">
+            <a:extLst>
+              <a:ext uri="{FF2B5EF4-FFF2-40B4-BE49-F238E27FC236}">
+                <a16:creationId xmlns:a16="http://schemas.microsoft.com/office/drawing/2014/main" id="{C8E1DEE0-C4BF-4869-80AE-FDF7983973F8}"/>
+              </a:ext>
+            </a:extLst>
+          </p:cNvPr>
+          <p:cNvSpPr>
+            <a:spLocks noGrp="1"/>
+          </p:cNvSpPr>
+          <p:nvPr>
+            <p:ph idx="1"/>
+          </p:nvPr>
+        </p:nvSpPr>
+        <p:spPr/>
+        <p:txBody>
+          <a:bodyPr/>
+          <a:lstStyle/>
+          <a:p>
+            <a:pPr marL="0" indent="0">
+              <a:buNone/>
+            </a:pPr>
+            <a:r>
+              <a:rPr lang="cs-CZ" dirty="0"/>
+              <a:t>Výpis poznámek patřících do jedné konkrétní kategorie máme hotový.</a:t>
+            </a:r>
+            <a:br>
+              <a:rPr lang="cs-CZ" dirty="0"/>
+            </a:br>
+            <a:r>
+              <a:rPr lang="cs-CZ" dirty="0"/>
+              <a:t>V dalším postupu si vyzkoušíme vytvoření </a:t>
+            </a:r>
+            <a:r>
+              <a:rPr lang="cs-CZ" dirty="0" err="1"/>
+              <a:t>NotesFacade</a:t>
+            </a:r>
+            <a:r>
+              <a:rPr lang="cs-CZ" dirty="0"/>
+              <a:t> a výpis všech poznámek bez ohledu na kategorii. </a:t>
+            </a:r>
+          </a:p>
+        </p:txBody>
+      </p:sp>
+    </p:spTree>
+    <p:extLst>
+      <p:ext uri="{BB962C8B-B14F-4D97-AF65-F5344CB8AC3E}">
+        <p14:creationId xmlns:p14="http://schemas.microsoft.com/office/powerpoint/2010/main" val="1425056149"/>
       </p:ext>
     </p:extLst>
   </p:cSld>

</xml_diff>